<commit_message>
Slides and queries for Session 2
</commit_message>
<xml_diff>
--- a/session2/B-SQL_Selection_Queries.pptx
+++ b/session2/B-SQL_Selection_Queries.pptx
@@ -315,7 +315,7 @@
             <a:fld id="{0F6AC800-BF99-41BB-8DE5-8FC7E09D6C23}" type="datetimeFigureOut">
               <a:rPr lang="en-US" smtClean="0"/>
               <a:pPr/>
-              <a:t>2/21/2020</a:t>
+              <a:t>3/11/2020</a:t>
             </a:fld>
             <a:endParaRPr lang="en-US" dirty="0"/>
           </a:p>
@@ -719,7 +719,7 @@
           <a:p>
             <a:fld id="{5F4C8C79-FAFE-4D56-A4D5-361B65C3B3FA}" type="datetimeFigureOut">
               <a:rPr lang="en-US" smtClean="0"/>
-              <a:t>2/21/2020</a:t>
+              <a:t>3/11/2020</a:t>
             </a:fld>
             <a:endParaRPr lang="en-US"/>
           </a:p>
@@ -889,7 +889,7 @@
           <a:p>
             <a:fld id="{5F4C8C79-FAFE-4D56-A4D5-361B65C3B3FA}" type="datetimeFigureOut">
               <a:rPr lang="en-US" smtClean="0"/>
-              <a:t>2/21/2020</a:t>
+              <a:t>3/11/2020</a:t>
             </a:fld>
             <a:endParaRPr lang="en-US"/>
           </a:p>
@@ -1069,7 +1069,7 @@
           <a:p>
             <a:fld id="{5F4C8C79-FAFE-4D56-A4D5-361B65C3B3FA}" type="datetimeFigureOut">
               <a:rPr lang="en-US" smtClean="0"/>
-              <a:t>2/21/2020</a:t>
+              <a:t>3/11/2020</a:t>
             </a:fld>
             <a:endParaRPr lang="en-US"/>
           </a:p>
@@ -1270,7 +1270,7 @@
           <a:p>
             <a:fld id="{5F4C8C79-FAFE-4D56-A4D5-361B65C3B3FA}" type="datetimeFigureOut">
               <a:rPr lang="en-US" smtClean="0"/>
-              <a:t>2/21/2020</a:t>
+              <a:t>3/11/2020</a:t>
             </a:fld>
             <a:endParaRPr lang="en-US"/>
           </a:p>
@@ -1514,7 +1514,7 @@
           <a:p>
             <a:fld id="{5F4C8C79-FAFE-4D56-A4D5-361B65C3B3FA}" type="datetimeFigureOut">
               <a:rPr lang="en-US" smtClean="0"/>
-              <a:t>2/21/2020</a:t>
+              <a:t>3/11/2020</a:t>
             </a:fld>
             <a:endParaRPr lang="en-US"/>
           </a:p>
@@ -1746,7 +1746,7 @@
           <a:p>
             <a:fld id="{5F4C8C79-FAFE-4D56-A4D5-361B65C3B3FA}" type="datetimeFigureOut">
               <a:rPr lang="en-US" smtClean="0"/>
-              <a:t>2/21/2020</a:t>
+              <a:t>3/11/2020</a:t>
             </a:fld>
             <a:endParaRPr lang="en-US"/>
           </a:p>
@@ -2113,7 +2113,7 @@
           <a:p>
             <a:fld id="{5F4C8C79-FAFE-4D56-A4D5-361B65C3B3FA}" type="datetimeFigureOut">
               <a:rPr lang="en-US" smtClean="0"/>
-              <a:t>2/21/2020</a:t>
+              <a:t>3/11/2020</a:t>
             </a:fld>
             <a:endParaRPr lang="en-US"/>
           </a:p>
@@ -2231,7 +2231,7 @@
           <a:p>
             <a:fld id="{5F4C8C79-FAFE-4D56-A4D5-361B65C3B3FA}" type="datetimeFigureOut">
               <a:rPr lang="en-US" smtClean="0"/>
-              <a:t>2/21/2020</a:t>
+              <a:t>3/11/2020</a:t>
             </a:fld>
             <a:endParaRPr lang="en-US"/>
           </a:p>
@@ -2326,7 +2326,7 @@
           <a:p>
             <a:fld id="{5F4C8C79-FAFE-4D56-A4D5-361B65C3B3FA}" type="datetimeFigureOut">
               <a:rPr lang="en-US" smtClean="0"/>
-              <a:t>2/21/2020</a:t>
+              <a:t>3/11/2020</a:t>
             </a:fld>
             <a:endParaRPr lang="en-US"/>
           </a:p>
@@ -2603,7 +2603,7 @@
           <a:p>
             <a:fld id="{5F4C8C79-FAFE-4D56-A4D5-361B65C3B3FA}" type="datetimeFigureOut">
               <a:rPr lang="en-US" smtClean="0"/>
-              <a:t>2/21/2020</a:t>
+              <a:t>3/11/2020</a:t>
             </a:fld>
             <a:endParaRPr lang="en-US"/>
           </a:p>
@@ -2860,7 +2860,7 @@
           <a:p>
             <a:fld id="{5F4C8C79-FAFE-4D56-A4D5-361B65C3B3FA}" type="datetimeFigureOut">
               <a:rPr lang="en-US" smtClean="0"/>
-              <a:t>2/21/2020</a:t>
+              <a:t>3/11/2020</a:t>
             </a:fld>
             <a:endParaRPr lang="en-US"/>
           </a:p>
@@ -3073,7 +3073,7 @@
             <a:fld id="{5F4C8C79-FAFE-4D56-A4D5-361B65C3B3FA}" type="datetimeFigureOut">
               <a:rPr lang="en-US" smtClean="0"/>
               <a:pPr/>
-              <a:t>2/21/2020</a:t>
+              <a:t>3/11/2020</a:t>
             </a:fld>
             <a:endParaRPr lang="en-US" dirty="0"/>
           </a:p>
@@ -3560,7 +3560,7 @@
           </a:ln>
           <a:extLst>
             <a:ext uri="{C572A759-6A51-4108-AA02-DFA0A04FC94B}">
-              <ma14:wrappingTextBoxFlag xmlns:ma14="http://schemas.microsoft.com/office/mac/drawingml/2011/main" xmlns="" val="1"/>
+              <ma14:wrappingTextBoxFlag xmlns="" xmlns:ma14="http://schemas.microsoft.com/office/mac/drawingml/2011/main" val="1"/>
             </a:ext>
           </a:extLst>
         </p:spPr>
@@ -3621,7 +3621,7 @@
           </a:ln>
           <a:extLst>
             <a:ext uri="{C572A759-6A51-4108-AA02-DFA0A04FC94B}">
-              <ma14:wrappingTextBoxFlag xmlns:ma14="http://schemas.microsoft.com/office/mac/drawingml/2011/main" xmlns="" val="1"/>
+              <ma14:wrappingTextBoxFlag xmlns="" xmlns:ma14="http://schemas.microsoft.com/office/mac/drawingml/2011/main" val="1"/>
             </a:ext>
           </a:extLst>
         </p:spPr>
@@ -4140,7 +4140,7 @@
           </a:ln>
           <a:extLst>
             <a:ext uri="{C572A759-6A51-4108-AA02-DFA0A04FC94B}">
-              <ma14:wrappingTextBoxFlag xmlns:ma14="http://schemas.microsoft.com/office/mac/drawingml/2011/main" xmlns="" val="1"/>
+              <ma14:wrappingTextBoxFlag xmlns="" xmlns:ma14="http://schemas.microsoft.com/office/mac/drawingml/2011/main" val="1"/>
             </a:ext>
           </a:extLst>
         </p:spPr>
@@ -4220,7 +4220,7 @@
           </a:ln>
           <a:extLst>
             <a:ext uri="{C572A759-6A51-4108-AA02-DFA0A04FC94B}">
-              <ma14:wrappingTextBoxFlag xmlns:ma14="http://schemas.microsoft.com/office/mac/drawingml/2011/main" xmlns="" val="1"/>
+              <ma14:wrappingTextBoxFlag xmlns="" xmlns:ma14="http://schemas.microsoft.com/office/mac/drawingml/2011/main" val="1"/>
             </a:ext>
           </a:extLst>
         </p:spPr>
@@ -4596,7 +4596,7 @@
           </a:ln>
           <a:extLst>
             <a:ext uri="{C572A759-6A51-4108-AA02-DFA0A04FC94B}">
-              <ma14:wrappingTextBoxFlag xmlns:ma14="http://schemas.microsoft.com/office/mac/drawingml/2011/main" xmlns="" val="1"/>
+              <ma14:wrappingTextBoxFlag xmlns="" xmlns:ma14="http://schemas.microsoft.com/office/mac/drawingml/2011/main" val="1"/>
             </a:ext>
           </a:extLst>
         </p:spPr>
@@ -5018,7 +5018,7 @@
           </a:ln>
           <a:extLst>
             <a:ext uri="{C572A759-6A51-4108-AA02-DFA0A04FC94B}">
-              <ma14:wrappingTextBoxFlag xmlns:ma14="http://schemas.microsoft.com/office/mac/drawingml/2011/main" xmlns="" val="1"/>
+              <ma14:wrappingTextBoxFlag xmlns="" xmlns:ma14="http://schemas.microsoft.com/office/mac/drawingml/2011/main" val="1"/>
             </a:ext>
           </a:extLst>
         </p:spPr>
@@ -5079,7 +5079,7 @@
           </a:ln>
           <a:extLst>
             <a:ext uri="{C572A759-6A51-4108-AA02-DFA0A04FC94B}">
-              <ma14:wrappingTextBoxFlag xmlns:ma14="http://schemas.microsoft.com/office/mac/drawingml/2011/main" xmlns="" val="1"/>
+              <ma14:wrappingTextBoxFlag xmlns="" xmlns:ma14="http://schemas.microsoft.com/office/mac/drawingml/2011/main" val="1"/>
             </a:ext>
           </a:extLst>
         </p:spPr>
@@ -5542,7 +5542,7 @@
                 <a:cs typeface="Arial Unicode MS" panose="020B0604020202020204" pitchFamily="34" charset="-128"/>
                 <a:sym typeface="Iowan Old Style Roman"/>
               </a:rPr>
-              <a:t>” attribute)</a:t>
+              <a:t>” attribute) – what is the problem?</a:t>
             </a:r>
           </a:p>
         </p:txBody>
@@ -5597,7 +5597,7 @@
           </a:ln>
           <a:extLst>
             <a:ext uri="{C572A759-6A51-4108-AA02-DFA0A04FC94B}">
-              <ma14:wrappingTextBoxFlag xmlns:ma14="http://schemas.microsoft.com/office/mac/drawingml/2011/main" xmlns="" val="1"/>
+              <ma14:wrappingTextBoxFlag xmlns="" xmlns:ma14="http://schemas.microsoft.com/office/mac/drawingml/2011/main" val="1"/>
             </a:ext>
           </a:extLst>
         </p:spPr>
@@ -5658,7 +5658,7 @@
           </a:ln>
           <a:extLst>
             <a:ext uri="{C572A759-6A51-4108-AA02-DFA0A04FC94B}">
-              <ma14:wrappingTextBoxFlag xmlns:ma14="http://schemas.microsoft.com/office/mac/drawingml/2011/main" xmlns="" val="1"/>
+              <ma14:wrappingTextBoxFlag xmlns="" xmlns:ma14="http://schemas.microsoft.com/office/mac/drawingml/2011/main" val="1"/>
             </a:ext>
           </a:extLst>
         </p:spPr>
@@ -5850,7 +5850,7 @@
           </a:ln>
           <a:extLst>
             <a:ext uri="{C572A759-6A51-4108-AA02-DFA0A04FC94B}">
-              <ma14:wrappingTextBoxFlag xmlns:ma14="http://schemas.microsoft.com/office/mac/drawingml/2011/main" xmlns="" val="1"/>
+              <ma14:wrappingTextBoxFlag xmlns="" xmlns:ma14="http://schemas.microsoft.com/office/mac/drawingml/2011/main" val="1"/>
             </a:ext>
           </a:extLst>
         </p:spPr>
@@ -5911,7 +5911,7 @@
           </a:ln>
           <a:extLst>
             <a:ext uri="{C572A759-6A51-4108-AA02-DFA0A04FC94B}">
-              <ma14:wrappingTextBoxFlag xmlns:ma14="http://schemas.microsoft.com/office/mac/drawingml/2011/main" xmlns="" val="1"/>
+              <ma14:wrappingTextBoxFlag xmlns="" xmlns:ma14="http://schemas.microsoft.com/office/mac/drawingml/2011/main" val="1"/>
             </a:ext>
           </a:extLst>
         </p:spPr>
@@ -6425,7 +6425,7 @@
           </a:ln>
           <a:extLst>
             <a:ext uri="{C572A759-6A51-4108-AA02-DFA0A04FC94B}">
-              <ma14:wrappingTextBoxFlag xmlns:ma14="http://schemas.microsoft.com/office/mac/drawingml/2011/main" xmlns="" val="1"/>
+              <ma14:wrappingTextBoxFlag xmlns="" xmlns:ma14="http://schemas.microsoft.com/office/mac/drawingml/2011/main" val="1"/>
             </a:ext>
           </a:extLst>
         </p:spPr>
@@ -6486,7 +6486,7 @@
           </a:ln>
           <a:extLst>
             <a:ext uri="{C572A759-6A51-4108-AA02-DFA0A04FC94B}">
-              <ma14:wrappingTextBoxFlag xmlns:ma14="http://schemas.microsoft.com/office/mac/drawingml/2011/main" xmlns="" val="1"/>
+              <ma14:wrappingTextBoxFlag xmlns="" xmlns:ma14="http://schemas.microsoft.com/office/mac/drawingml/2011/main" val="1"/>
             </a:ext>
           </a:extLst>
         </p:spPr>
@@ -6779,7 +6779,7 @@
           </a:ln>
           <a:extLst>
             <a:ext uri="{C572A759-6A51-4108-AA02-DFA0A04FC94B}">
-              <ma14:wrappingTextBoxFlag xmlns:ma14="http://schemas.microsoft.com/office/mac/drawingml/2011/main" xmlns="" val="1"/>
+              <ma14:wrappingTextBoxFlag xmlns="" xmlns:ma14="http://schemas.microsoft.com/office/mac/drawingml/2011/main" val="1"/>
             </a:ext>
           </a:extLst>
         </p:spPr>
@@ -6840,7 +6840,7 @@
           </a:ln>
           <a:extLst>
             <a:ext uri="{C572A759-6A51-4108-AA02-DFA0A04FC94B}">
-              <ma14:wrappingTextBoxFlag xmlns:ma14="http://schemas.microsoft.com/office/mac/drawingml/2011/main" xmlns="" val="1"/>
+              <ma14:wrappingTextBoxFlag xmlns="" xmlns:ma14="http://schemas.microsoft.com/office/mac/drawingml/2011/main" val="1"/>
             </a:ext>
           </a:extLst>
         </p:spPr>
@@ -7104,7 +7104,7 @@
           </a:ln>
           <a:extLst>
             <a:ext uri="{C572A759-6A51-4108-AA02-DFA0A04FC94B}">
-              <ma14:wrappingTextBoxFlag xmlns:ma14="http://schemas.microsoft.com/office/mac/drawingml/2011/main" xmlns="" val="1"/>
+              <ma14:wrappingTextBoxFlag xmlns="" xmlns:ma14="http://schemas.microsoft.com/office/mac/drawingml/2011/main" val="1"/>
             </a:ext>
           </a:extLst>
         </p:spPr>
@@ -7165,7 +7165,7 @@
           </a:ln>
           <a:extLst>
             <a:ext uri="{C572A759-6A51-4108-AA02-DFA0A04FC94B}">
-              <ma14:wrappingTextBoxFlag xmlns:ma14="http://schemas.microsoft.com/office/mac/drawingml/2011/main" xmlns="" val="1"/>
+              <ma14:wrappingTextBoxFlag xmlns="" xmlns:ma14="http://schemas.microsoft.com/office/mac/drawingml/2011/main" val="1"/>
             </a:ext>
           </a:extLst>
         </p:spPr>
@@ -7630,7 +7630,7 @@
           </a:ln>
           <a:extLst>
             <a:ext uri="{C572A759-6A51-4108-AA02-DFA0A04FC94B}">
-              <ma14:wrappingTextBoxFlag xmlns:ma14="http://schemas.microsoft.com/office/mac/drawingml/2011/main" xmlns="" val="1"/>
+              <ma14:wrappingTextBoxFlag xmlns="" xmlns:ma14="http://schemas.microsoft.com/office/mac/drawingml/2011/main" val="1"/>
             </a:ext>
           </a:extLst>
         </p:spPr>
@@ -7710,7 +7710,7 @@
           </a:ln>
           <a:extLst>
             <a:ext uri="{C572A759-6A51-4108-AA02-DFA0A04FC94B}">
-              <ma14:wrappingTextBoxFlag xmlns:ma14="http://schemas.microsoft.com/office/mac/drawingml/2011/main" xmlns="" val="1"/>
+              <ma14:wrappingTextBoxFlag xmlns="" xmlns:ma14="http://schemas.microsoft.com/office/mac/drawingml/2011/main" val="1"/>
             </a:ext>
           </a:extLst>
         </p:spPr>
@@ -8006,7 +8006,7 @@
           </a:ln>
           <a:extLst>
             <a:ext uri="{C572A759-6A51-4108-AA02-DFA0A04FC94B}">
-              <ma14:wrappingTextBoxFlag xmlns:ma14="http://schemas.microsoft.com/office/mac/drawingml/2011/main" xmlns="" val="1"/>
+              <ma14:wrappingTextBoxFlag xmlns="" xmlns:ma14="http://schemas.microsoft.com/office/mac/drawingml/2011/main" val="1"/>
             </a:ext>
           </a:extLst>
         </p:spPr>
@@ -8128,7 +8128,7 @@
           </a:ln>
           <a:extLst>
             <a:ext uri="{C572A759-6A51-4108-AA02-DFA0A04FC94B}">
-              <ma14:wrappingTextBoxFlag xmlns:ma14="http://schemas.microsoft.com/office/mac/drawingml/2011/main" xmlns="" val="1"/>
+              <ma14:wrappingTextBoxFlag xmlns="" xmlns:ma14="http://schemas.microsoft.com/office/mac/drawingml/2011/main" val="1"/>
             </a:ext>
           </a:extLst>
         </p:spPr>
@@ -8189,7 +8189,7 @@
           </a:ln>
           <a:extLst>
             <a:ext uri="{C572A759-6A51-4108-AA02-DFA0A04FC94B}">
-              <ma14:wrappingTextBoxFlag xmlns:ma14="http://schemas.microsoft.com/office/mac/drawingml/2011/main" xmlns="" val="1"/>
+              <ma14:wrappingTextBoxFlag xmlns="" xmlns:ma14="http://schemas.microsoft.com/office/mac/drawingml/2011/main" val="1"/>
             </a:ext>
           </a:extLst>
         </p:spPr>
@@ -8737,7 +8737,7 @@
           </a:ln>
           <a:extLst>
             <a:ext uri="{C572A759-6A51-4108-AA02-DFA0A04FC94B}">
-              <ma14:wrappingTextBoxFlag xmlns:ma14="http://schemas.microsoft.com/office/mac/drawingml/2011/main" xmlns="" val="1"/>
+              <ma14:wrappingTextBoxFlag xmlns="" xmlns:ma14="http://schemas.microsoft.com/office/mac/drawingml/2011/main" val="1"/>
             </a:ext>
           </a:extLst>
         </p:spPr>
@@ -8820,7 +8820,7 @@
           </a:ln>
           <a:extLst>
             <a:ext uri="{C572A759-6A51-4108-AA02-DFA0A04FC94B}">
-              <ma14:wrappingTextBoxFlag xmlns:ma14="http://schemas.microsoft.com/office/mac/drawingml/2011/main" xmlns="" val="1"/>
+              <ma14:wrappingTextBoxFlag xmlns="" xmlns:ma14="http://schemas.microsoft.com/office/mac/drawingml/2011/main" val="1"/>
             </a:ext>
           </a:extLst>
         </p:spPr>
@@ -9081,7 +9081,7 @@
           </a:ln>
           <a:extLst>
             <a:ext uri="{C572A759-6A51-4108-AA02-DFA0A04FC94B}">
-              <ma14:wrappingTextBoxFlag xmlns:ma14="http://schemas.microsoft.com/office/mac/drawingml/2011/main" xmlns="" val="1"/>
+              <ma14:wrappingTextBoxFlag xmlns="" xmlns:ma14="http://schemas.microsoft.com/office/mac/drawingml/2011/main" val="1"/>
             </a:ext>
           </a:extLst>
         </p:spPr>

</xml_diff>